<commit_message>
many to many test
</commit_message>
<xml_diff>
--- a/doc/readme.pptx
+++ b/doc/readme.pptx
@@ -5,7 +5,9 @@
     <p:sldMasterId id="2147483648" r:id="rId1"/>
   </p:sldMasterIdLst>
   <p:sldIdLst>
-    <p:sldId id="256" r:id="rId2"/>
+    <p:sldId id="257" r:id="rId2"/>
+    <p:sldId id="258" r:id="rId3"/>
+    <p:sldId id="256" r:id="rId4"/>
   </p:sldIdLst>
   <p:sldSz cx="12192000" cy="6858000"/>
   <p:notesSz cx="6858000" cy="9144000"/>
@@ -3305,6 +3307,448 @@
 </file>
 
 <file path=ppt/slides/slide1.xml><?xml version="1.0" encoding="utf-8"?>
+<p:sld xmlns:a="http://schemas.openxmlformats.org/drawingml/2006/main" xmlns:r="http://schemas.openxmlformats.org/officeDocument/2006/relationships" xmlns:p="http://schemas.openxmlformats.org/presentationml/2006/main">
+  <p:cSld>
+    <p:spTree>
+      <p:nvGrpSpPr>
+        <p:cNvPr id="1" name=""/>
+        <p:cNvGrpSpPr/>
+        <p:nvPr/>
+      </p:nvGrpSpPr>
+      <p:grpSpPr>
+        <a:xfrm>
+          <a:off x="0" y="0"/>
+          <a:ext cx="0" cy="0"/>
+          <a:chOff x="0" y="0"/>
+          <a:chExt cx="0" cy="0"/>
+        </a:xfrm>
+      </p:grpSpPr>
+      <p:sp>
+        <p:nvSpPr>
+          <p:cNvPr id="5" name="TextBox 4">
+            <a:extLst>
+              <a:ext uri="{FF2B5EF4-FFF2-40B4-BE49-F238E27FC236}">
+                <a16:creationId xmlns:a16="http://schemas.microsoft.com/office/drawing/2014/main" id="{05788CAA-2625-6AD7-B1C3-FFB6DEA85506}"/>
+              </a:ext>
+            </a:extLst>
+          </p:cNvPr>
+          <p:cNvSpPr txBox="1"/>
+          <p:nvPr/>
+        </p:nvSpPr>
+        <p:spPr>
+          <a:xfrm>
+            <a:off x="481614" y="485598"/>
+            <a:ext cx="6094520" cy="369332"/>
+          </a:xfrm>
+          <a:prstGeom prst="rect">
+            <a:avLst/>
+          </a:prstGeom>
+          <a:noFill/>
+        </p:spPr>
+        <p:txBody>
+          <a:bodyPr wrap="square">
+            <a:spAutoFit/>
+          </a:bodyPr>
+          <a:lstStyle/>
+          <a:p>
+            <a:r>
+              <a:rPr lang="ko-KR" altLang="en-US" dirty="0"/>
+              <a:t>https://www.youtube.com/watch?v=VVn9OG9nfH0</a:t>
+            </a:r>
+          </a:p>
+        </p:txBody>
+      </p:sp>
+      <p:pic>
+        <p:nvPicPr>
+          <p:cNvPr id="7" name="그림 6">
+            <a:extLst>
+              <a:ext uri="{FF2B5EF4-FFF2-40B4-BE49-F238E27FC236}">
+                <a16:creationId xmlns:a16="http://schemas.microsoft.com/office/drawing/2014/main" id="{643DC02D-464E-2E2B-5DA9-0A00CC0DDF89}"/>
+              </a:ext>
+            </a:extLst>
+          </p:cNvPr>
+          <p:cNvPicPr>
+            <a:picLocks noChangeAspect="1"/>
+          </p:cNvPicPr>
+          <p:nvPr/>
+        </p:nvPicPr>
+        <p:blipFill>
+          <a:blip r:embed="rId2"/>
+          <a:stretch>
+            <a:fillRect/>
+          </a:stretch>
+        </p:blipFill>
+        <p:spPr>
+          <a:xfrm>
+            <a:off x="960038" y="1151203"/>
+            <a:ext cx="1962424" cy="1714739"/>
+          </a:xfrm>
+          <a:prstGeom prst="rect">
+            <a:avLst/>
+          </a:prstGeom>
+        </p:spPr>
+      </p:pic>
+      <p:sp>
+        <p:nvSpPr>
+          <p:cNvPr id="9" name="TextBox 8">
+            <a:extLst>
+              <a:ext uri="{FF2B5EF4-FFF2-40B4-BE49-F238E27FC236}">
+                <a16:creationId xmlns:a16="http://schemas.microsoft.com/office/drawing/2014/main" id="{E3470B50-B6D1-DE2B-2F0E-DDA9ADD8A44B}"/>
+              </a:ext>
+            </a:extLst>
+          </p:cNvPr>
+          <p:cNvSpPr txBox="1"/>
+          <p:nvPr/>
+        </p:nvSpPr>
+        <p:spPr>
+          <a:xfrm>
+            <a:off x="3048740" y="1151203"/>
+            <a:ext cx="6094520" cy="646331"/>
+          </a:xfrm>
+          <a:prstGeom prst="rect">
+            <a:avLst/>
+          </a:prstGeom>
+          <a:noFill/>
+        </p:spPr>
+        <p:txBody>
+          <a:bodyPr wrap="square">
+            <a:spAutoFit/>
+          </a:bodyPr>
+          <a:lstStyle/>
+          <a:p>
+            <a:pPr algn="l"/>
+            <a:r>
+              <a:rPr lang="en-US" altLang="ko-KR" b="0" i="0" dirty="0">
+                <a:effectLst/>
+                <a:latin typeface="Roboto" panose="02000000000000000000" pitchFamily="2" charset="0"/>
+              </a:rPr>
+              <a:t>Spring Boot and Spring Security with JWT including Access and Refresh Tokens </a:t>
+            </a:r>
+          </a:p>
+        </p:txBody>
+      </p:sp>
+    </p:spTree>
+    <p:extLst>
+      <p:ext uri="{BB962C8B-B14F-4D97-AF65-F5344CB8AC3E}">
+        <p14:creationId xmlns:p14="http://schemas.microsoft.com/office/powerpoint/2010/main" val="198083536"/>
+      </p:ext>
+    </p:extLst>
+  </p:cSld>
+  <p:clrMapOvr>
+    <a:masterClrMapping/>
+  </p:clrMapOvr>
+</p:sld>
+</file>
+
+<file path=ppt/slides/slide2.xml><?xml version="1.0" encoding="utf-8"?>
+<p:sld xmlns:a="http://schemas.openxmlformats.org/drawingml/2006/main" xmlns:r="http://schemas.openxmlformats.org/officeDocument/2006/relationships" xmlns:p="http://schemas.openxmlformats.org/presentationml/2006/main">
+  <p:cSld>
+    <p:spTree>
+      <p:nvGrpSpPr>
+        <p:cNvPr id="1" name=""/>
+        <p:cNvGrpSpPr/>
+        <p:nvPr/>
+      </p:nvGrpSpPr>
+      <p:grpSpPr>
+        <a:xfrm>
+          <a:off x="0" y="0"/>
+          <a:ext cx="0" cy="0"/>
+          <a:chOff x="0" y="0"/>
+          <a:chExt cx="0" cy="0"/>
+        </a:xfrm>
+      </p:grpSpPr>
+      <p:sp>
+        <p:nvSpPr>
+          <p:cNvPr id="5" name="TextBox 4">
+            <a:extLst>
+              <a:ext uri="{FF2B5EF4-FFF2-40B4-BE49-F238E27FC236}">
+                <a16:creationId xmlns:a16="http://schemas.microsoft.com/office/drawing/2014/main" id="{26256874-5CAE-D659-F964-8172835C73D2}"/>
+              </a:ext>
+            </a:extLst>
+          </p:cNvPr>
+          <p:cNvSpPr txBox="1"/>
+          <p:nvPr/>
+        </p:nvSpPr>
+        <p:spPr>
+          <a:xfrm>
+            <a:off x="375082" y="299166"/>
+            <a:ext cx="6094520" cy="369332"/>
+          </a:xfrm>
+          <a:prstGeom prst="rect">
+            <a:avLst/>
+          </a:prstGeom>
+          <a:noFill/>
+        </p:spPr>
+        <p:txBody>
+          <a:bodyPr wrap="square">
+            <a:spAutoFit/>
+          </a:bodyPr>
+          <a:lstStyle/>
+          <a:p>
+            <a:r>
+              <a:rPr lang="en-US" altLang="ko-KR" b="0" i="0" dirty="0">
+                <a:solidFill>
+                  <a:srgbClr val="212121"/>
+                </a:solidFill>
+                <a:effectLst/>
+                <a:latin typeface="Inter"/>
+              </a:rPr>
+              <a:t>http://localhost:8080/api/accounts</a:t>
+            </a:r>
+            <a:endParaRPr lang="ko-KR" altLang="en-US" dirty="0"/>
+          </a:p>
+        </p:txBody>
+      </p:sp>
+      <p:pic>
+        <p:nvPicPr>
+          <p:cNvPr id="7" name="그림 6">
+            <a:extLst>
+              <a:ext uri="{FF2B5EF4-FFF2-40B4-BE49-F238E27FC236}">
+                <a16:creationId xmlns:a16="http://schemas.microsoft.com/office/drawing/2014/main" id="{344159E2-6FB9-CF11-47CF-418BF51F7E01}"/>
+              </a:ext>
+            </a:extLst>
+          </p:cNvPr>
+          <p:cNvPicPr>
+            <a:picLocks noChangeAspect="1"/>
+          </p:cNvPicPr>
+          <p:nvPr/>
+        </p:nvPicPr>
+        <p:blipFill>
+          <a:blip r:embed="rId2"/>
+          <a:stretch>
+            <a:fillRect/>
+          </a:stretch>
+        </p:blipFill>
+        <p:spPr>
+          <a:xfrm>
+            <a:off x="440083" y="668498"/>
+            <a:ext cx="6094520" cy="3411204"/>
+          </a:xfrm>
+          <a:prstGeom prst="rect">
+            <a:avLst/>
+          </a:prstGeom>
+        </p:spPr>
+      </p:pic>
+      <p:pic>
+        <p:nvPicPr>
+          <p:cNvPr id="9" name="그림 8">
+            <a:extLst>
+              <a:ext uri="{FF2B5EF4-FFF2-40B4-BE49-F238E27FC236}">
+                <a16:creationId xmlns:a16="http://schemas.microsoft.com/office/drawing/2014/main" id="{580C6F0F-D973-824A-C1FD-4B5617435BB1}"/>
+              </a:ext>
+            </a:extLst>
+          </p:cNvPr>
+          <p:cNvPicPr>
+            <a:picLocks noChangeAspect="1"/>
+          </p:cNvPicPr>
+          <p:nvPr/>
+        </p:nvPicPr>
+        <p:blipFill>
+          <a:blip r:embed="rId3"/>
+          <a:stretch>
+            <a:fillRect/>
+          </a:stretch>
+        </p:blipFill>
+        <p:spPr>
+          <a:xfrm>
+            <a:off x="6889072" y="668498"/>
+            <a:ext cx="3417514" cy="2258925"/>
+          </a:xfrm>
+          <a:prstGeom prst="rect">
+            <a:avLst/>
+          </a:prstGeom>
+        </p:spPr>
+      </p:pic>
+      <p:sp>
+        <p:nvSpPr>
+          <p:cNvPr id="10" name="TextBox 9">
+            <a:extLst>
+              <a:ext uri="{FF2B5EF4-FFF2-40B4-BE49-F238E27FC236}">
+                <a16:creationId xmlns:a16="http://schemas.microsoft.com/office/drawing/2014/main" id="{CE11CD4A-C833-D4B7-5361-DBED0F1F9822}"/>
+              </a:ext>
+            </a:extLst>
+          </p:cNvPr>
+          <p:cNvSpPr txBox="1"/>
+          <p:nvPr/>
+        </p:nvSpPr>
+        <p:spPr>
+          <a:xfrm>
+            <a:off x="6889072" y="299166"/>
+            <a:ext cx="3551068" cy="369332"/>
+          </a:xfrm>
+          <a:prstGeom prst="rect">
+            <a:avLst/>
+          </a:prstGeom>
+          <a:noFill/>
+        </p:spPr>
+        <p:txBody>
+          <a:bodyPr wrap="square">
+            <a:spAutoFit/>
+          </a:bodyPr>
+          <a:lstStyle/>
+          <a:p>
+            <a:r>
+              <a:rPr lang="en-US" altLang="ko-KR" dirty="0" err="1"/>
+              <a:t>FetchType.LAZY</a:t>
+            </a:r>
+            <a:r>
+              <a:rPr lang="ko-KR" altLang="en-US" dirty="0"/>
+              <a:t>을 추가</a:t>
+            </a:r>
+          </a:p>
+        </p:txBody>
+      </p:sp>
+      <p:pic>
+        <p:nvPicPr>
+          <p:cNvPr id="12" name="그림 11">
+            <a:extLst>
+              <a:ext uri="{FF2B5EF4-FFF2-40B4-BE49-F238E27FC236}">
+                <a16:creationId xmlns:a16="http://schemas.microsoft.com/office/drawing/2014/main" id="{10FBC4E0-EC2E-3EFD-01CD-8D4DFDFF5D66}"/>
+              </a:ext>
+            </a:extLst>
+          </p:cNvPr>
+          <p:cNvPicPr>
+            <a:picLocks noChangeAspect="1"/>
+          </p:cNvPicPr>
+          <p:nvPr/>
+        </p:nvPicPr>
+        <p:blipFill>
+          <a:blip r:embed="rId4"/>
+          <a:stretch>
+            <a:fillRect/>
+          </a:stretch>
+        </p:blipFill>
+        <p:spPr>
+          <a:xfrm>
+            <a:off x="6889072" y="3296755"/>
+            <a:ext cx="4329612" cy="1838242"/>
+          </a:xfrm>
+          <a:prstGeom prst="rect">
+            <a:avLst/>
+          </a:prstGeom>
+        </p:spPr>
+      </p:pic>
+      <p:sp>
+        <p:nvSpPr>
+          <p:cNvPr id="13" name="TextBox 12">
+            <a:extLst>
+              <a:ext uri="{FF2B5EF4-FFF2-40B4-BE49-F238E27FC236}">
+                <a16:creationId xmlns:a16="http://schemas.microsoft.com/office/drawing/2014/main" id="{D43A1122-6302-0B83-23C5-65D3A460DD81}"/>
+              </a:ext>
+            </a:extLst>
+          </p:cNvPr>
+          <p:cNvSpPr txBox="1"/>
+          <p:nvPr/>
+        </p:nvSpPr>
+        <p:spPr>
+          <a:xfrm>
+            <a:off x="6889072" y="2927423"/>
+            <a:ext cx="5220070" cy="276999"/>
+          </a:xfrm>
+          <a:prstGeom prst="rect">
+            <a:avLst/>
+          </a:prstGeom>
+          <a:noFill/>
+        </p:spPr>
+        <p:txBody>
+          <a:bodyPr wrap="square">
+            <a:spAutoFit/>
+          </a:bodyPr>
+          <a:lstStyle/>
+          <a:p>
+            <a:r>
+              <a:rPr lang="en-US" altLang="ko-KR" sz="1200" dirty="0" err="1"/>
+              <a:t>FetchType.LAZY</a:t>
+            </a:r>
+            <a:r>
+              <a:rPr lang="ko-KR" altLang="en-US" sz="1200" dirty="0"/>
+              <a:t>을 추가해도 잠깐의 시간 이후 같은 결과를 표시</a:t>
+            </a:r>
+          </a:p>
+        </p:txBody>
+      </p:sp>
+      <p:sp>
+        <p:nvSpPr>
+          <p:cNvPr id="19" name="TextBox 18">
+            <a:extLst>
+              <a:ext uri="{FF2B5EF4-FFF2-40B4-BE49-F238E27FC236}">
+                <a16:creationId xmlns:a16="http://schemas.microsoft.com/office/drawing/2014/main" id="{A3DD0CC3-48E3-E00A-F008-73EA34EB4A3F}"/>
+              </a:ext>
+            </a:extLst>
+          </p:cNvPr>
+          <p:cNvSpPr txBox="1"/>
+          <p:nvPr/>
+        </p:nvSpPr>
+        <p:spPr>
+          <a:xfrm>
+            <a:off x="491129" y="4079702"/>
+            <a:ext cx="6094520" cy="923330"/>
+          </a:xfrm>
+          <a:prstGeom prst="rect">
+            <a:avLst/>
+          </a:prstGeom>
+          <a:noFill/>
+        </p:spPr>
+        <p:txBody>
+          <a:bodyPr wrap="square">
+            <a:spAutoFit/>
+          </a:bodyPr>
+          <a:lstStyle/>
+          <a:p>
+            <a:r>
+              <a:rPr lang="en-US" altLang="ko-KR" b="0" dirty="0">
+                <a:solidFill>
+                  <a:srgbClr val="0451A5"/>
+                </a:solidFill>
+                <a:effectLst/>
+                <a:latin typeface="IBMPlexMono,  Courier New"/>
+              </a:rPr>
+              <a:t>Request processing failed; nested exception is org.springframework.http.converter.HttpMessageNotWritableException: Could not write JSON: Infinite recursion (</a:t>
+            </a:r>
+            <a:r>
+              <a:rPr lang="en-US" altLang="ko-KR" b="0" dirty="0" err="1">
+                <a:solidFill>
+                  <a:srgbClr val="0451A5"/>
+                </a:solidFill>
+                <a:effectLst/>
+                <a:latin typeface="IBMPlexMono,  Courier New"/>
+              </a:rPr>
+              <a:t>StackOverflowError</a:t>
+            </a:r>
+            <a:r>
+              <a:rPr lang="en-US" altLang="ko-KR" b="0" dirty="0">
+                <a:solidFill>
+                  <a:srgbClr val="0451A5"/>
+                </a:solidFill>
+                <a:effectLst/>
+                <a:latin typeface="IBMPlexMono,  Courier New"/>
+              </a:rPr>
+              <a:t>); </a:t>
+            </a:r>
+            <a:endParaRPr lang="en-US" altLang="ko-KR" b="0" dirty="0">
+              <a:solidFill>
+                <a:srgbClr val="000000"/>
+              </a:solidFill>
+              <a:effectLst/>
+              <a:latin typeface="IBMPlexMono,  Courier New"/>
+            </a:endParaRPr>
+          </a:p>
+        </p:txBody>
+      </p:sp>
+    </p:spTree>
+    <p:extLst>
+      <p:ext uri="{BB962C8B-B14F-4D97-AF65-F5344CB8AC3E}">
+        <p14:creationId xmlns:p14="http://schemas.microsoft.com/office/powerpoint/2010/main" val="1289826623"/>
+      </p:ext>
+    </p:extLst>
+  </p:cSld>
+  <p:clrMapOvr>
+    <a:masterClrMapping/>
+  </p:clrMapOvr>
+</p:sld>
+</file>
+
+<file path=ppt/slides/slide3.xml><?xml version="1.0" encoding="utf-8"?>
 <p:sld xmlns:a="http://schemas.openxmlformats.org/drawingml/2006/main" xmlns:r="http://schemas.openxmlformats.org/officeDocument/2006/relationships" xmlns:p="http://schemas.openxmlformats.org/presentationml/2006/main">
   <p:cSld>
     <p:spTree>

</xml_diff>